<commit_message>
Replace graphs with 3D graphs, and self review
</commit_message>
<xml_diff>
--- a/graphs/simplex_tree.pptx
+++ b/graphs/simplex_tree.pptx
@@ -243,7 +243,7 @@
           <a:p>
             <a:fld id="{C28F08EC-7670-4442-9616-97FFFB084A18}" type="datetimeFigureOut">
               <a:rPr lang="en-US" smtClean="0"/>
-              <a:t>12/18/16</a:t>
+              <a:t>12/28/16</a:t>
             </a:fld>
             <a:endParaRPr lang="en-US"/>
           </a:p>
@@ -413,7 +413,7 @@
           <a:p>
             <a:fld id="{C28F08EC-7670-4442-9616-97FFFB084A18}" type="datetimeFigureOut">
               <a:rPr lang="en-US" smtClean="0"/>
-              <a:t>12/18/16</a:t>
+              <a:t>12/28/16</a:t>
             </a:fld>
             <a:endParaRPr lang="en-US"/>
           </a:p>
@@ -593,7 +593,7 @@
           <a:p>
             <a:fld id="{C28F08EC-7670-4442-9616-97FFFB084A18}" type="datetimeFigureOut">
               <a:rPr lang="en-US" smtClean="0"/>
-              <a:t>12/18/16</a:t>
+              <a:t>12/28/16</a:t>
             </a:fld>
             <a:endParaRPr lang="en-US"/>
           </a:p>
@@ -763,7 +763,7 @@
           <a:p>
             <a:fld id="{C28F08EC-7670-4442-9616-97FFFB084A18}" type="datetimeFigureOut">
               <a:rPr lang="en-US" smtClean="0"/>
-              <a:t>12/18/16</a:t>
+              <a:t>12/28/16</a:t>
             </a:fld>
             <a:endParaRPr lang="en-US"/>
           </a:p>
@@ -1009,7 +1009,7 @@
           <a:p>
             <a:fld id="{C28F08EC-7670-4442-9616-97FFFB084A18}" type="datetimeFigureOut">
               <a:rPr lang="en-US" smtClean="0"/>
-              <a:t>12/18/16</a:t>
+              <a:t>12/28/16</a:t>
             </a:fld>
             <a:endParaRPr lang="en-US"/>
           </a:p>
@@ -1241,7 +1241,7 @@
           <a:p>
             <a:fld id="{C28F08EC-7670-4442-9616-97FFFB084A18}" type="datetimeFigureOut">
               <a:rPr lang="en-US" smtClean="0"/>
-              <a:t>12/18/16</a:t>
+              <a:t>12/28/16</a:t>
             </a:fld>
             <a:endParaRPr lang="en-US"/>
           </a:p>
@@ -1608,7 +1608,7 @@
           <a:p>
             <a:fld id="{C28F08EC-7670-4442-9616-97FFFB084A18}" type="datetimeFigureOut">
               <a:rPr lang="en-US" smtClean="0"/>
-              <a:t>12/18/16</a:t>
+              <a:t>12/28/16</a:t>
             </a:fld>
             <a:endParaRPr lang="en-US"/>
           </a:p>
@@ -1726,7 +1726,7 @@
           <a:p>
             <a:fld id="{C28F08EC-7670-4442-9616-97FFFB084A18}" type="datetimeFigureOut">
               <a:rPr lang="en-US" smtClean="0"/>
-              <a:t>12/18/16</a:t>
+              <a:t>12/28/16</a:t>
             </a:fld>
             <a:endParaRPr lang="en-US"/>
           </a:p>
@@ -1821,7 +1821,7 @@
           <a:p>
             <a:fld id="{C28F08EC-7670-4442-9616-97FFFB084A18}" type="datetimeFigureOut">
               <a:rPr lang="en-US" smtClean="0"/>
-              <a:t>12/18/16</a:t>
+              <a:t>12/28/16</a:t>
             </a:fld>
             <a:endParaRPr lang="en-US"/>
           </a:p>
@@ -2098,7 +2098,7 @@
           <a:p>
             <a:fld id="{C28F08EC-7670-4442-9616-97FFFB084A18}" type="datetimeFigureOut">
               <a:rPr lang="en-US" smtClean="0"/>
-              <a:t>12/18/16</a:t>
+              <a:t>12/28/16</a:t>
             </a:fld>
             <a:endParaRPr lang="en-US"/>
           </a:p>
@@ -2351,7 +2351,7 @@
           <a:p>
             <a:fld id="{C28F08EC-7670-4442-9616-97FFFB084A18}" type="datetimeFigureOut">
               <a:rPr lang="en-US" smtClean="0"/>
-              <a:t>12/18/16</a:t>
+              <a:t>12/28/16</a:t>
             </a:fld>
             <a:endParaRPr lang="en-US"/>
           </a:p>
@@ -2564,7 +2564,7 @@
           <a:p>
             <a:fld id="{C28F08EC-7670-4442-9616-97FFFB084A18}" type="datetimeFigureOut">
               <a:rPr lang="en-US" smtClean="0"/>
-              <a:t>12/18/16</a:t>
+              <a:t>12/28/16</a:t>
             </a:fld>
             <a:endParaRPr lang="en-US"/>
           </a:p>
@@ -2969,8 +2969,8 @@
           <a:chExt cx="0" cy="0"/>
         </a:xfrm>
       </p:grpSpPr>
-      <mc:AlternateContent xmlns:mc="http://schemas.openxmlformats.org/markup-compatibility/2006" xmlns:a14="http://schemas.microsoft.com/office/drawing/2010/main">
-        <mc:Choice Requires="a14">
+      <mc:AlternateContent xmlns:mc="http://schemas.openxmlformats.org/markup-compatibility/2006">
+        <mc:Choice xmlns:a14="http://schemas.microsoft.com/office/drawing/2010/main" Requires="a14">
           <p:sp>
             <p:nvSpPr>
               <p:cNvPr id="10" name="Rounded Rectangle 9"/>
@@ -2979,8 +2979,8 @@
             </p:nvSpPr>
             <p:spPr>
               <a:xfrm>
-                <a:off x="3080801" y="693352"/>
-                <a:ext cx="1924340" cy="467342"/>
+                <a:off x="3177056" y="705384"/>
+                <a:ext cx="2056683" cy="467342"/>
               </a:xfrm>
               <a:prstGeom prst="roundRect">
                 <a:avLst/>
@@ -3012,7 +3012,7 @@
               </a:fontRef>
             </p:style>
             <p:txBody>
-              <a:bodyPr lIns="288000" tIns="72000" rIns="288000" bIns="72000" rtlCol="0" anchor="ctr">
+              <a:bodyPr wrap="square" lIns="288000" tIns="72000" rIns="288000" bIns="72000" rtlCol="0" anchor="ctr">
                 <a:spAutoFit/>
               </a:bodyPr>
               <a:lstStyle/>
@@ -3047,10 +3047,10 @@
                         <m:e>
                           <m:d>
                             <m:dPr>
-                              <m:begChr m:val="{"/>
-                              <m:endChr m:val="}"/>
+                              <m:begChr m:val="|"/>
+                              <m:endChr m:val="|"/>
                               <m:ctrlPr>
-                                <a:rPr lang="en-US" b="0" i="1" smtClean="0">
+                                <a:rPr lang="hr-HR" b="0" i="1" smtClean="0">
                                   <a:solidFill>
                                     <a:schemeClr val="tx1"/>
                                   </a:solidFill>
@@ -3059,15 +3059,31 @@
                               </m:ctrlPr>
                             </m:dPr>
                             <m:e>
-                              <m:r>
-                                <a:rPr lang="en-US" b="0" i="1" smtClean="0">
-                                  <a:solidFill>
-                                    <a:schemeClr val="tx1"/>
-                                  </a:solidFill>
-                                  <a:latin typeface="Cambria Math" charset="0"/>
-                                </a:rPr>
-                                <m:t>2,3</m:t>
-                              </m:r>
+                              <m:d>
+                                <m:dPr>
+                                  <m:begChr m:val="{"/>
+                                  <m:endChr m:val="}"/>
+                                  <m:ctrlPr>
+                                    <a:rPr lang="en-US" i="1">
+                                      <a:solidFill>
+                                        <a:schemeClr val="tx1"/>
+                                      </a:solidFill>
+                                      <a:latin typeface="Cambria Math" charset="0"/>
+                                    </a:rPr>
+                                  </m:ctrlPr>
+                                </m:dPr>
+                                <m:e>
+                                  <m:r>
+                                    <a:rPr lang="en-US" i="1">
+                                      <a:solidFill>
+                                        <a:schemeClr val="tx1"/>
+                                      </a:solidFill>
+                                      <a:latin typeface="Cambria Math" charset="0"/>
+                                    </a:rPr>
+                                    <m:t>2,3</m:t>
+                                  </m:r>
+                                </m:e>
+                              </m:d>
                             </m:e>
                           </m:d>
                           <m:r>
@@ -3141,7 +3157,7 @@
             </p:txBody>
           </p:sp>
         </mc:Choice>
-        <mc:Fallback xmlns="">
+        <mc:Fallback>
           <p:sp>
             <p:nvSpPr>
               <p:cNvPr id="10" name="Rounded Rectangle 9"/>
@@ -3152,8 +3168,8 @@
             </p:nvSpPr>
             <p:spPr>
               <a:xfrm>
-                <a:off x="3080801" y="693352"/>
-                <a:ext cx="1924340" cy="467342"/>
+                <a:off x="3177056" y="705384"/>
+                <a:ext cx="2056683" cy="467342"/>
               </a:xfrm>
               <a:prstGeom prst="roundRect">
                 <a:avLst/>
@@ -3194,8 +3210,8 @@
         </p:nvCxnSpPr>
         <p:spPr>
           <a:xfrm flipV="1">
-            <a:off x="2757842" y="927023"/>
-            <a:ext cx="322959" cy="1501021"/>
+            <a:off x="2830690" y="939055"/>
+            <a:ext cx="346366" cy="1775596"/>
           </a:xfrm>
           <a:prstGeom prst="straightConnector1">
             <a:avLst/>
@@ -3235,8 +3251,8 @@
         </p:nvCxnSpPr>
         <p:spPr>
           <a:xfrm>
-            <a:off x="2757842" y="2428044"/>
-            <a:ext cx="322959" cy="2130930"/>
+            <a:off x="2830690" y="2714651"/>
+            <a:ext cx="214215" cy="1892451"/>
           </a:xfrm>
           <a:prstGeom prst="straightConnector1">
             <a:avLst/>
@@ -3265,8 +3281,8 @@
           </a:fontRef>
         </p:style>
       </p:cxnSp>
-      <mc:AlternateContent xmlns:mc="http://schemas.openxmlformats.org/markup-compatibility/2006" xmlns:a14="http://schemas.microsoft.com/office/drawing/2010/main">
-        <mc:Choice Requires="a14">
+      <mc:AlternateContent xmlns:mc="http://schemas.openxmlformats.org/markup-compatibility/2006">
+        <mc:Choice xmlns:a14="http://schemas.microsoft.com/office/drawing/2010/main" Requires="a14">
           <p:sp>
             <p:nvSpPr>
               <p:cNvPr id="39" name="Rounded Rectangle 38"/>
@@ -3275,8 +3291,8 @@
             </p:nvSpPr>
             <p:spPr>
               <a:xfrm>
-                <a:off x="3080801" y="4120388"/>
-                <a:ext cx="2278557" cy="877171"/>
+                <a:off x="3044905" y="4168516"/>
+                <a:ext cx="2410710" cy="877171"/>
               </a:xfrm>
               <a:prstGeom prst="roundRect">
                 <a:avLst/>
@@ -3308,7 +3324,7 @@
               </a:fontRef>
             </p:style>
             <p:txBody>
-              <a:bodyPr lIns="288000" tIns="72000" rIns="288000" bIns="72000" rtlCol="0" anchor="ctr">
+              <a:bodyPr wrap="square" lIns="288000" tIns="72000" rIns="288000" bIns="72000" rtlCol="0" anchor="ctr">
                 <a:spAutoFit/>
               </a:bodyPr>
               <a:lstStyle/>
@@ -3343,10 +3359,10 @@
                         <m:e>
                           <m:d>
                             <m:dPr>
-                              <m:begChr m:val="{"/>
-                              <m:endChr m:val="}"/>
+                              <m:begChr m:val="|"/>
+                              <m:endChr m:val="|"/>
                               <m:ctrlPr>
-                                <a:rPr lang="en-US" b="0" i="1" smtClean="0">
+                                <a:rPr lang="hr-HR" b="0" i="1" smtClean="0">
                                   <a:solidFill>
                                     <a:schemeClr val="tx1"/>
                                   </a:solidFill>
@@ -3355,15 +3371,31 @@
                               </m:ctrlPr>
                             </m:dPr>
                             <m:e>
-                              <m:r>
-                                <a:rPr lang="en-US" b="0" i="1" smtClean="0">
-                                  <a:solidFill>
-                                    <a:schemeClr val="tx1"/>
-                                  </a:solidFill>
-                                  <a:latin typeface="Cambria Math" charset="0"/>
-                                </a:rPr>
-                                <m:t>1,2,3</m:t>
-                              </m:r>
+                              <m:d>
+                                <m:dPr>
+                                  <m:begChr m:val="{"/>
+                                  <m:endChr m:val="}"/>
+                                  <m:ctrlPr>
+                                    <a:rPr lang="en-US" i="1">
+                                      <a:solidFill>
+                                        <a:schemeClr val="tx1"/>
+                                      </a:solidFill>
+                                      <a:latin typeface="Cambria Math" charset="0"/>
+                                    </a:rPr>
+                                  </m:ctrlPr>
+                                </m:dPr>
+                                <m:e>
+                                  <m:r>
+                                    <a:rPr lang="en-US" i="1">
+                                      <a:solidFill>
+                                        <a:schemeClr val="tx1"/>
+                                      </a:solidFill>
+                                      <a:latin typeface="Cambria Math" charset="0"/>
+                                    </a:rPr>
+                                    <m:t>1,2,3</m:t>
+                                  </m:r>
+                                </m:e>
+                              </m:d>
                             </m:e>
                           </m:d>
                           <m:r>
@@ -3471,7 +3503,7 @@
             </p:txBody>
           </p:sp>
         </mc:Choice>
-        <mc:Fallback xmlns="">
+        <mc:Fallback>
           <p:sp>
             <p:nvSpPr>
               <p:cNvPr id="39" name="Rounded Rectangle 38"/>
@@ -3482,8 +3514,8 @@
             </p:nvSpPr>
             <p:spPr>
               <a:xfrm>
-                <a:off x="3080801" y="4120388"/>
-                <a:ext cx="2278557" cy="877171"/>
+                <a:off x="3044905" y="4168516"/>
+                <a:ext cx="2410710" cy="877171"/>
               </a:xfrm>
               <a:prstGeom prst="roundRect">
                 <a:avLst/>
@@ -3513,8 +3545,8 @@
           </p:sp>
         </mc:Fallback>
       </mc:AlternateContent>
-      <mc:AlternateContent xmlns:mc="http://schemas.openxmlformats.org/markup-compatibility/2006" xmlns:a14="http://schemas.microsoft.com/office/drawing/2010/main">
-        <mc:Choice Requires="a14">
+      <mc:AlternateContent xmlns:mc="http://schemas.openxmlformats.org/markup-compatibility/2006">
+        <mc:Choice xmlns:a14="http://schemas.microsoft.com/office/drawing/2010/main" Requires="a14">
           <p:sp>
             <p:nvSpPr>
               <p:cNvPr id="40" name="Rounded Rectangle 39"/>
@@ -3523,8 +3555,8 @@
             </p:nvSpPr>
             <p:spPr>
               <a:xfrm>
-                <a:off x="186512" y="2194372"/>
-                <a:ext cx="2103330" cy="467342"/>
+                <a:off x="114319" y="2483126"/>
+                <a:ext cx="2248371" cy="467342"/>
               </a:xfrm>
               <a:prstGeom prst="roundRect">
                 <a:avLst/>
@@ -3556,7 +3588,7 @@
               </a:fontRef>
             </p:style>
             <p:txBody>
-              <a:bodyPr lIns="288000" tIns="72000" rIns="288000" bIns="72000" rtlCol="0" anchor="ctr">
+              <a:bodyPr wrap="square" lIns="288000" tIns="72000" rIns="288000" bIns="72000" rtlCol="0" anchor="ctr">
                 <a:spAutoFit/>
               </a:bodyPr>
               <a:lstStyle/>
@@ -3591,10 +3623,10 @@
                         <m:e>
                           <m:d>
                             <m:dPr>
-                              <m:begChr m:val="{"/>
-                              <m:endChr m:val="}"/>
+                              <m:begChr m:val="|"/>
+                              <m:endChr m:val="|"/>
                               <m:ctrlPr>
-                                <a:rPr lang="en-US" b="0" i="1" smtClean="0">
+                                <a:rPr lang="hr-HR" b="0" i="1" smtClean="0">
                                   <a:solidFill>
                                     <a:schemeClr val="tx1"/>
                                   </a:solidFill>
@@ -3603,15 +3635,31 @@
                               </m:ctrlPr>
                             </m:dPr>
                             <m:e>
-                              <m:r>
-                                <a:rPr lang="en-US" b="0" i="1" smtClean="0">
-                                  <a:solidFill>
-                                    <a:schemeClr val="tx1"/>
-                                  </a:solidFill>
-                                  <a:latin typeface="Cambria Math" charset="0"/>
-                                </a:rPr>
-                                <m:t>1,2,3</m:t>
-                              </m:r>
+                              <m:d>
+                                <m:dPr>
+                                  <m:begChr m:val="{"/>
+                                  <m:endChr m:val="}"/>
+                                  <m:ctrlPr>
+                                    <a:rPr lang="en-US" i="1">
+                                      <a:solidFill>
+                                        <a:schemeClr val="tx1"/>
+                                      </a:solidFill>
+                                      <a:latin typeface="Cambria Math" charset="0"/>
+                                    </a:rPr>
+                                  </m:ctrlPr>
+                                </m:dPr>
+                                <m:e>
+                                  <m:r>
+                                    <a:rPr lang="en-US" i="1">
+                                      <a:solidFill>
+                                        <a:schemeClr val="tx1"/>
+                                      </a:solidFill>
+                                      <a:latin typeface="Cambria Math" charset="0"/>
+                                    </a:rPr>
+                                    <m:t>1,2,3</m:t>
+                                  </m:r>
+                                </m:e>
+                              </m:d>
                             </m:e>
                           </m:d>
                           <m:r>
@@ -3685,7 +3733,7 @@
             </p:txBody>
           </p:sp>
         </mc:Choice>
-        <mc:Fallback xmlns="">
+        <mc:Fallback>
           <p:sp>
             <p:nvSpPr>
               <p:cNvPr id="40" name="Rounded Rectangle 39"/>
@@ -3696,8 +3744,8 @@
             </p:nvSpPr>
             <p:spPr>
               <a:xfrm>
-                <a:off x="186512" y="2194372"/>
-                <a:ext cx="2103330" cy="467342"/>
+                <a:off x="114319" y="2483126"/>
+                <a:ext cx="2248371" cy="467342"/>
               </a:xfrm>
               <a:prstGeom prst="roundRect">
                 <a:avLst/>
@@ -3727,8 +3775,8 @@
           </p:sp>
         </mc:Fallback>
       </mc:AlternateContent>
-      <mc:AlternateContent xmlns:mc="http://schemas.openxmlformats.org/markup-compatibility/2006" xmlns:a14="http://schemas.microsoft.com/office/drawing/2010/main">
-        <mc:Choice Requires="a14">
+      <mc:AlternateContent xmlns:mc="http://schemas.openxmlformats.org/markup-compatibility/2006">
+        <mc:Choice xmlns:a14="http://schemas.microsoft.com/office/drawing/2010/main" Requires="a14">
           <p:sp>
             <p:nvSpPr>
               <p:cNvPr id="51" name="Rounded Rectangle 50"/>
@@ -3737,8 +3785,8 @@
             </p:nvSpPr>
             <p:spPr>
               <a:xfrm>
-                <a:off x="6123690" y="194907"/>
-                <a:ext cx="1773038" cy="467342"/>
+                <a:off x="6220331" y="194907"/>
+                <a:ext cx="1868907" cy="467342"/>
               </a:xfrm>
               <a:prstGeom prst="roundRect">
                 <a:avLst/>
@@ -3770,7 +3818,7 @@
               </a:fontRef>
             </p:style>
             <p:txBody>
-              <a:bodyPr lIns="288000" tIns="72000" rIns="288000" bIns="72000" rtlCol="0" anchor="ctr">
+              <a:bodyPr wrap="square" lIns="288000" tIns="72000" rIns="288000" bIns="72000" rtlCol="0" anchor="ctr">
                 <a:spAutoFit/>
               </a:bodyPr>
               <a:lstStyle/>
@@ -3805,10 +3853,10 @@
                         <m:e>
                           <m:d>
                             <m:dPr>
-                              <m:begChr m:val="{"/>
-                              <m:endChr m:val="}"/>
+                              <m:begChr m:val="|"/>
+                              <m:endChr m:val="|"/>
                               <m:ctrlPr>
-                                <a:rPr lang="en-US" b="0" i="1" smtClean="0">
+                                <a:rPr lang="hr-HR" b="0" i="1" smtClean="0">
                                   <a:solidFill>
                                     <a:schemeClr val="tx1"/>
                                   </a:solidFill>
@@ -3817,15 +3865,31 @@
                               </m:ctrlPr>
                             </m:dPr>
                             <m:e>
-                              <m:r>
-                                <a:rPr lang="en-US" b="0" i="1" smtClean="0">
-                                  <a:solidFill>
-                                    <a:schemeClr val="tx1"/>
-                                  </a:solidFill>
-                                  <a:latin typeface="Cambria Math" charset="0"/>
-                                </a:rPr>
-                                <m:t>2</m:t>
-                              </m:r>
+                              <m:d>
+                                <m:dPr>
+                                  <m:begChr m:val="{"/>
+                                  <m:endChr m:val="}"/>
+                                  <m:ctrlPr>
+                                    <a:rPr lang="en-US" i="1">
+                                      <a:solidFill>
+                                        <a:schemeClr val="tx1"/>
+                                      </a:solidFill>
+                                      <a:latin typeface="Cambria Math" charset="0"/>
+                                    </a:rPr>
+                                  </m:ctrlPr>
+                                </m:dPr>
+                                <m:e>
+                                  <m:r>
+                                    <a:rPr lang="en-US" i="1">
+                                      <a:solidFill>
+                                        <a:schemeClr val="tx1"/>
+                                      </a:solidFill>
+                                      <a:latin typeface="Cambria Math" charset="0"/>
+                                    </a:rPr>
+                                    <m:t>2</m:t>
+                                  </m:r>
+                                </m:e>
+                              </m:d>
                             </m:e>
                           </m:d>
                           <m:r>
@@ -3899,7 +3963,7 @@
             </p:txBody>
           </p:sp>
         </mc:Choice>
-        <mc:Fallback xmlns="">
+        <mc:Fallback>
           <p:sp>
             <p:nvSpPr>
               <p:cNvPr id="51" name="Rounded Rectangle 50"/>
@@ -3910,8 +3974,8 @@
             </p:nvSpPr>
             <p:spPr>
               <a:xfrm>
-                <a:off x="6123690" y="194907"/>
-                <a:ext cx="1773038" cy="467342"/>
+                <a:off x="6220331" y="194907"/>
+                <a:ext cx="1868907" cy="467342"/>
               </a:xfrm>
               <a:prstGeom prst="roundRect">
                 <a:avLst/>
@@ -3951,8 +4015,8 @@
             </p:nvSpPr>
             <p:spPr>
               <a:xfrm>
-                <a:off x="6117674" y="1002784"/>
-                <a:ext cx="2123958" cy="888879"/>
+                <a:off x="6220331" y="1002784"/>
+                <a:ext cx="2213811" cy="888879"/>
               </a:xfrm>
               <a:prstGeom prst="roundRect">
                 <a:avLst/>
@@ -4019,10 +4083,10 @@
                         <m:e>
                           <m:d>
                             <m:dPr>
-                              <m:begChr m:val="{"/>
-                              <m:endChr m:val="}"/>
+                              <m:begChr m:val="|"/>
+                              <m:endChr m:val="|"/>
                               <m:ctrlPr>
-                                <a:rPr lang="en-US" b="0" i="1" smtClean="0">
+                                <a:rPr lang="hr-HR" b="0" i="1" smtClean="0">
                                   <a:solidFill>
                                     <a:schemeClr val="tx1"/>
                                   </a:solidFill>
@@ -4031,15 +4095,31 @@
                               </m:ctrlPr>
                             </m:dPr>
                             <m:e>
-                              <m:r>
-                                <a:rPr lang="en-US" b="0" i="1" smtClean="0">
-                                  <a:solidFill>
-                                    <a:schemeClr val="tx1"/>
-                                  </a:solidFill>
-                                  <a:latin typeface="Cambria Math" charset="0"/>
-                                </a:rPr>
-                                <m:t>2,3</m:t>
-                              </m:r>
+                              <m:d>
+                                <m:dPr>
+                                  <m:begChr m:val="{"/>
+                                  <m:endChr m:val="}"/>
+                                  <m:ctrlPr>
+                                    <a:rPr lang="en-US" i="1">
+                                      <a:solidFill>
+                                        <a:schemeClr val="tx1"/>
+                                      </a:solidFill>
+                                      <a:latin typeface="Cambria Math" charset="0"/>
+                                    </a:rPr>
+                                  </m:ctrlPr>
+                                </m:dPr>
+                                <m:e>
+                                  <m:r>
+                                    <a:rPr lang="en-US" i="1">
+                                      <a:solidFill>
+                                        <a:schemeClr val="tx1"/>
+                                      </a:solidFill>
+                                      <a:latin typeface="Cambria Math" charset="0"/>
+                                    </a:rPr>
+                                    <m:t>2,3</m:t>
+                                  </m:r>
+                                </m:e>
+                              </m:d>
                             </m:e>
                           </m:d>
                           <m:r>
@@ -4158,8 +4238,8 @@
             </p:nvSpPr>
             <p:spPr>
               <a:xfrm>
-                <a:off x="6117674" y="1002784"/>
-                <a:ext cx="2123958" cy="888879"/>
+                <a:off x="6220331" y="1002784"/>
+                <a:ext cx="2213811" cy="888879"/>
               </a:xfrm>
               <a:prstGeom prst="roundRect">
                 <a:avLst/>
@@ -4199,8 +4279,8 @@
             </p:nvSpPr>
             <p:spPr>
               <a:xfrm>
-                <a:off x="6117674" y="3147626"/>
-                <a:ext cx="2172084" cy="877171"/>
+                <a:off x="6220331" y="3123562"/>
+                <a:ext cx="2261937" cy="877171"/>
               </a:xfrm>
               <a:prstGeom prst="roundRect">
                 <a:avLst/>
@@ -4267,10 +4347,10 @@
                         <m:e>
                           <m:d>
                             <m:dPr>
-                              <m:begChr m:val="{"/>
-                              <m:endChr m:val="}"/>
+                              <m:begChr m:val="|"/>
+                              <m:endChr m:val="|"/>
                               <m:ctrlPr>
-                                <a:rPr lang="en-US" b="0" i="1" smtClean="0">
+                                <a:rPr lang="hr-HR" b="0" i="1" smtClean="0">
                                   <a:solidFill>
                                     <a:schemeClr val="tx1"/>
                                   </a:solidFill>
@@ -4279,15 +4359,31 @@
                               </m:ctrlPr>
                             </m:dPr>
                             <m:e>
-                              <m:r>
-                                <a:rPr lang="en-US" b="0" i="1" smtClean="0">
-                                  <a:solidFill>
-                                    <a:schemeClr val="tx1"/>
-                                  </a:solidFill>
-                                  <a:latin typeface="Cambria Math" charset="0"/>
-                                </a:rPr>
-                                <m:t>1,3</m:t>
-                              </m:r>
+                              <m:d>
+                                <m:dPr>
+                                  <m:begChr m:val="{"/>
+                                  <m:endChr m:val="}"/>
+                                  <m:ctrlPr>
+                                    <a:rPr lang="en-US" i="1">
+                                      <a:solidFill>
+                                        <a:schemeClr val="tx1"/>
+                                      </a:solidFill>
+                                      <a:latin typeface="Cambria Math" charset="0"/>
+                                    </a:rPr>
+                                  </m:ctrlPr>
+                                </m:dPr>
+                                <m:e>
+                                  <m:r>
+                                    <a:rPr lang="en-US" i="1">
+                                      <a:solidFill>
+                                        <a:schemeClr val="tx1"/>
+                                      </a:solidFill>
+                                      <a:latin typeface="Cambria Math" charset="0"/>
+                                    </a:rPr>
+                                    <m:t>1,3</m:t>
+                                  </m:r>
+                                </m:e>
+                              </m:d>
                             </m:e>
                           </m:d>
                           <m:r>
@@ -4406,8 +4502,8 @@
             </p:nvSpPr>
             <p:spPr>
               <a:xfrm>
-                <a:off x="6117674" y="3147626"/>
-                <a:ext cx="2172084" cy="877171"/>
+                <a:off x="6220331" y="3123562"/>
+                <a:ext cx="2261937" cy="877171"/>
               </a:xfrm>
               <a:prstGeom prst="roundRect">
                 <a:avLst/>
@@ -4437,8 +4533,8 @@
           </p:sp>
         </mc:Fallback>
       </mc:AlternateContent>
-      <mc:AlternateContent xmlns:mc="http://schemas.openxmlformats.org/markup-compatibility/2006" xmlns:a14="http://schemas.microsoft.com/office/drawing/2010/main">
-        <mc:Choice Requires="a14">
+      <mc:AlternateContent xmlns:mc="http://schemas.openxmlformats.org/markup-compatibility/2006">
+        <mc:Choice xmlns:a14="http://schemas.microsoft.com/office/drawing/2010/main" Requires="a14">
           <p:sp>
             <p:nvSpPr>
               <p:cNvPr id="54" name="Rounded Rectangle 53"/>
@@ -4447,8 +4543,8 @@
             </p:nvSpPr>
             <p:spPr>
               <a:xfrm>
-                <a:off x="6117674" y="5280760"/>
-                <a:ext cx="2410711" cy="877171"/>
+                <a:off x="6220332" y="5256696"/>
+                <a:ext cx="2500564" cy="877171"/>
               </a:xfrm>
               <a:prstGeom prst="roundRect">
                 <a:avLst/>
@@ -4480,7 +4576,7 @@
               </a:fontRef>
             </p:style>
             <p:txBody>
-              <a:bodyPr lIns="288000" tIns="72000" rIns="288000" bIns="72000" rtlCol="0" anchor="ctr">
+              <a:bodyPr wrap="square" lIns="288000" tIns="72000" rIns="288000" bIns="72000" rtlCol="0" anchor="ctr">
                 <a:spAutoFit/>
               </a:bodyPr>
               <a:lstStyle/>
@@ -4515,10 +4611,10 @@
                         <m:e>
                           <m:d>
                             <m:dPr>
-                              <m:begChr m:val="{"/>
-                              <m:endChr m:val="}"/>
+                              <m:begChr m:val="|"/>
+                              <m:endChr m:val="|"/>
                               <m:ctrlPr>
-                                <a:rPr lang="en-US" b="0" i="1" smtClean="0">
+                                <a:rPr lang="hr-HR" b="0" i="1" smtClean="0">
                                   <a:solidFill>
                                     <a:schemeClr val="tx1"/>
                                   </a:solidFill>
@@ -4527,15 +4623,31 @@
                               </m:ctrlPr>
                             </m:dPr>
                             <m:e>
-                              <m:r>
-                                <a:rPr lang="en-US" b="0" i="1" smtClean="0">
-                                  <a:solidFill>
-                                    <a:schemeClr val="tx1"/>
-                                  </a:solidFill>
-                                  <a:latin typeface="Cambria Math" charset="0"/>
-                                </a:rPr>
-                                <m:t>1,2,3</m:t>
-                              </m:r>
+                              <m:d>
+                                <m:dPr>
+                                  <m:begChr m:val="{"/>
+                                  <m:endChr m:val="}"/>
+                                  <m:ctrlPr>
+                                    <a:rPr lang="en-US" i="1">
+                                      <a:solidFill>
+                                        <a:schemeClr val="tx1"/>
+                                      </a:solidFill>
+                                      <a:latin typeface="Cambria Math" charset="0"/>
+                                    </a:rPr>
+                                  </m:ctrlPr>
+                                </m:dPr>
+                                <m:e>
+                                  <m:r>
+                                    <a:rPr lang="en-US" i="1">
+                                      <a:solidFill>
+                                        <a:schemeClr val="tx1"/>
+                                      </a:solidFill>
+                                      <a:latin typeface="Cambria Math" charset="0"/>
+                                    </a:rPr>
+                                    <m:t>1,2,3</m:t>
+                                  </m:r>
+                                </m:e>
+                              </m:d>
                             </m:e>
                           </m:d>
                           <m:r>
@@ -4686,7 +4798,7 @@
             </p:txBody>
           </p:sp>
         </mc:Choice>
-        <mc:Fallback xmlns="">
+        <mc:Fallback>
           <p:sp>
             <p:nvSpPr>
               <p:cNvPr id="54" name="Rounded Rectangle 53"/>
@@ -4697,8 +4809,8 @@
             </p:nvSpPr>
             <p:spPr>
               <a:xfrm>
-                <a:off x="6117674" y="5280760"/>
-                <a:ext cx="2410711" cy="877171"/>
+                <a:off x="6220332" y="5256696"/>
+                <a:ext cx="2500564" cy="877171"/>
               </a:xfrm>
               <a:prstGeom prst="roundRect">
                 <a:avLst/>
@@ -4739,8 +4851,8 @@
         </p:nvCxnSpPr>
         <p:spPr>
           <a:xfrm flipV="1">
-            <a:off x="5476438" y="428578"/>
-            <a:ext cx="647252" cy="498446"/>
+            <a:off x="5707044" y="428578"/>
+            <a:ext cx="513287" cy="505997"/>
           </a:xfrm>
           <a:prstGeom prst="straightConnector1">
             <a:avLst/>
@@ -4780,8 +4892,8 @@
         </p:nvCxnSpPr>
         <p:spPr>
           <a:xfrm>
-            <a:off x="5476438" y="927024"/>
-            <a:ext cx="641236" cy="520200"/>
+            <a:off x="5707044" y="934575"/>
+            <a:ext cx="513287" cy="512649"/>
           </a:xfrm>
           <a:prstGeom prst="straightConnector1">
             <a:avLst/>
@@ -4821,8 +4933,8 @@
         </p:nvCxnSpPr>
         <p:spPr>
           <a:xfrm flipV="1">
-            <a:off x="5827358" y="3586212"/>
-            <a:ext cx="290316" cy="972761"/>
+            <a:off x="5923614" y="3562148"/>
+            <a:ext cx="296717" cy="1044953"/>
           </a:xfrm>
           <a:prstGeom prst="straightConnector1">
             <a:avLst/>
@@ -4862,8 +4974,8 @@
         </p:nvCxnSpPr>
         <p:spPr>
           <a:xfrm>
-            <a:off x="5827358" y="4558973"/>
-            <a:ext cx="290316" cy="1160373"/>
+            <a:off x="5923614" y="4607101"/>
+            <a:ext cx="296718" cy="1088181"/>
           </a:xfrm>
           <a:prstGeom prst="straightConnector1">
             <a:avLst/>
@@ -4902,8 +5014,8 @@
             </p:nvSpPr>
             <p:spPr>
               <a:xfrm>
-                <a:off x="9475260" y="486292"/>
-                <a:ext cx="1966771" cy="877171"/>
+                <a:off x="9516982" y="486292"/>
+                <a:ext cx="2081463" cy="877171"/>
               </a:xfrm>
               <a:prstGeom prst="roundRect">
                 <a:avLst/>
@@ -4970,10 +5082,10 @@
                         <m:e>
                           <m:d>
                             <m:dPr>
-                              <m:begChr m:val="{"/>
-                              <m:endChr m:val="}"/>
+                              <m:begChr m:val="|"/>
+                              <m:endChr m:val="|"/>
                               <m:ctrlPr>
-                                <a:rPr lang="en-US" b="0" i="1" smtClean="0">
+                                <a:rPr lang="hr-HR" b="0" i="1" smtClean="0">
                                   <a:solidFill>
                                     <a:schemeClr val="tx1"/>
                                   </a:solidFill>
@@ -4982,15 +5094,31 @@
                               </m:ctrlPr>
                             </m:dPr>
                             <m:e>
-                              <m:r>
-                                <a:rPr lang="en-US" b="0" i="1" smtClean="0">
-                                  <a:solidFill>
-                                    <a:schemeClr val="tx1"/>
-                                  </a:solidFill>
-                                  <a:latin typeface="Cambria Math" charset="0"/>
-                                </a:rPr>
-                                <m:t>3</m:t>
-                              </m:r>
+                              <m:d>
+                                <m:dPr>
+                                  <m:begChr m:val="{"/>
+                                  <m:endChr m:val="}"/>
+                                  <m:ctrlPr>
+                                    <a:rPr lang="en-US" i="1">
+                                      <a:solidFill>
+                                        <a:schemeClr val="tx1"/>
+                                      </a:solidFill>
+                                      <a:latin typeface="Cambria Math" charset="0"/>
+                                    </a:rPr>
+                                  </m:ctrlPr>
+                                </m:dPr>
+                                <m:e>
+                                  <m:r>
+                                    <a:rPr lang="en-US" i="1">
+                                      <a:solidFill>
+                                        <a:schemeClr val="tx1"/>
+                                      </a:solidFill>
+                                      <a:latin typeface="Cambria Math" charset="0"/>
+                                    </a:rPr>
+                                    <m:t>3</m:t>
+                                  </m:r>
+                                </m:e>
+                              </m:d>
                             </m:e>
                           </m:d>
                           <m:r>
@@ -5109,8 +5237,8 @@
             </p:nvSpPr>
             <p:spPr>
               <a:xfrm>
-                <a:off x="9475260" y="486292"/>
-                <a:ext cx="1966771" cy="877171"/>
+                <a:off x="9516982" y="486292"/>
+                <a:ext cx="2081463" cy="877171"/>
               </a:xfrm>
               <a:prstGeom prst="roundRect">
                 <a:avLst/>
@@ -5150,8 +5278,8 @@
             </p:nvSpPr>
             <p:spPr>
               <a:xfrm>
-                <a:off x="9475261" y="1542872"/>
-                <a:ext cx="2207402" cy="883025"/>
+                <a:off x="9516982" y="1542872"/>
+                <a:ext cx="2322095" cy="883025"/>
               </a:xfrm>
               <a:prstGeom prst="roundRect">
                 <a:avLst/>
@@ -5218,10 +5346,10 @@
                         <m:e>
                           <m:d>
                             <m:dPr>
-                              <m:begChr m:val="{"/>
-                              <m:endChr m:val="}"/>
+                              <m:begChr m:val="|"/>
+                              <m:endChr m:val="|"/>
                               <m:ctrlPr>
-                                <a:rPr lang="en-US" b="0" i="1" smtClean="0">
+                                <a:rPr lang="hr-HR" b="0" i="1" smtClean="0">
                                   <a:solidFill>
                                     <a:schemeClr val="tx1"/>
                                   </a:solidFill>
@@ -5230,15 +5358,31 @@
                               </m:ctrlPr>
                             </m:dPr>
                             <m:e>
-                              <m:r>
-                                <a:rPr lang="en-US" b="0" i="1" smtClean="0">
-                                  <a:solidFill>
-                                    <a:schemeClr val="tx1"/>
-                                  </a:solidFill>
-                                  <a:latin typeface="Cambria Math" charset="0"/>
-                                </a:rPr>
-                                <m:t>2,3</m:t>
-                              </m:r>
+                              <m:d>
+                                <m:dPr>
+                                  <m:begChr m:val="{"/>
+                                  <m:endChr m:val="}"/>
+                                  <m:ctrlPr>
+                                    <a:rPr lang="en-US" i="1">
+                                      <a:solidFill>
+                                        <a:schemeClr val="tx1"/>
+                                      </a:solidFill>
+                                      <a:latin typeface="Cambria Math" charset="0"/>
+                                    </a:rPr>
+                                  </m:ctrlPr>
+                                </m:dPr>
+                                <m:e>
+                                  <m:r>
+                                    <a:rPr lang="en-US" i="1">
+                                      <a:solidFill>
+                                        <a:schemeClr val="tx1"/>
+                                      </a:solidFill>
+                                      <a:latin typeface="Cambria Math" charset="0"/>
+                                    </a:rPr>
+                                    <m:t>2,3</m:t>
+                                  </m:r>
+                                </m:e>
+                              </m:d>
                             </m:e>
                           </m:d>
                           <m:r>
@@ -5400,8 +5544,8 @@
             </p:nvSpPr>
             <p:spPr>
               <a:xfrm>
-                <a:off x="9475261" y="1542872"/>
-                <a:ext cx="2207402" cy="883025"/>
+                <a:off x="9516982" y="1542872"/>
+                <a:ext cx="2322095" cy="883025"/>
               </a:xfrm>
               <a:prstGeom prst="roundRect">
                 <a:avLst/>
@@ -5431,8 +5575,8 @@
           </p:sp>
         </mc:Fallback>
       </mc:AlternateContent>
-      <mc:AlternateContent xmlns:mc="http://schemas.openxmlformats.org/markup-compatibility/2006" xmlns:a14="http://schemas.microsoft.com/office/drawing/2010/main">
-        <mc:Choice Requires="a14">
+      <mc:AlternateContent xmlns:mc="http://schemas.openxmlformats.org/markup-compatibility/2006">
+        <mc:Choice xmlns:a14="http://schemas.microsoft.com/office/drawing/2010/main" Requires="a14">
           <p:sp>
             <p:nvSpPr>
               <p:cNvPr id="72" name="Rounded Rectangle 71"/>
@@ -5441,8 +5585,8 @@
             </p:nvSpPr>
             <p:spPr>
               <a:xfrm>
-                <a:off x="9475261" y="2604305"/>
-                <a:ext cx="2010109" cy="877171"/>
+                <a:off x="9516983" y="2604305"/>
+                <a:ext cx="2124802" cy="877171"/>
               </a:xfrm>
               <a:prstGeom prst="roundRect">
                 <a:avLst/>
@@ -5474,7 +5618,7 @@
               </a:fontRef>
             </p:style>
             <p:txBody>
-              <a:bodyPr lIns="288000" tIns="72000" rIns="288000" bIns="72000" rtlCol="0" anchor="ctr">
+              <a:bodyPr wrap="square" lIns="288000" tIns="72000" rIns="288000" bIns="72000" rtlCol="0" anchor="ctr">
                 <a:spAutoFit/>
               </a:bodyPr>
               <a:lstStyle/>
@@ -5509,10 +5653,10 @@
                         <m:e>
                           <m:d>
                             <m:dPr>
-                              <m:begChr m:val="{"/>
-                              <m:endChr m:val="}"/>
+                              <m:begChr m:val="|"/>
+                              <m:endChr m:val="|"/>
                               <m:ctrlPr>
-                                <a:rPr lang="en-US" b="0" i="1" smtClean="0">
+                                <a:rPr lang="hr-HR" b="0" i="1" smtClean="0">
                                   <a:solidFill>
                                     <a:schemeClr val="tx1"/>
                                   </a:solidFill>
@@ -5521,15 +5665,31 @@
                               </m:ctrlPr>
                             </m:dPr>
                             <m:e>
-                              <m:r>
-                                <a:rPr lang="en-US" b="0" i="1" smtClean="0">
-                                  <a:solidFill>
-                                    <a:schemeClr val="tx1"/>
-                                  </a:solidFill>
-                                  <a:latin typeface="Cambria Math" charset="0"/>
-                                </a:rPr>
-                                <m:t>1</m:t>
-                              </m:r>
+                              <m:d>
+                                <m:dPr>
+                                  <m:begChr m:val="{"/>
+                                  <m:endChr m:val="}"/>
+                                  <m:ctrlPr>
+                                    <a:rPr lang="en-US" i="1">
+                                      <a:solidFill>
+                                        <a:schemeClr val="tx1"/>
+                                      </a:solidFill>
+                                      <a:latin typeface="Cambria Math" charset="0"/>
+                                    </a:rPr>
+                                  </m:ctrlPr>
+                                </m:dPr>
+                                <m:e>
+                                  <m:r>
+                                    <a:rPr lang="en-US" i="1">
+                                      <a:solidFill>
+                                        <a:schemeClr val="tx1"/>
+                                      </a:solidFill>
+                                      <a:latin typeface="Cambria Math" charset="0"/>
+                                    </a:rPr>
+                                    <m:t>1</m:t>
+                                  </m:r>
+                                </m:e>
+                              </m:d>
                             </m:e>
                           </m:d>
                           <m:r>
@@ -5637,7 +5797,7 @@
             </p:txBody>
           </p:sp>
         </mc:Choice>
-        <mc:Fallback xmlns="">
+        <mc:Fallback>
           <p:sp>
             <p:nvSpPr>
               <p:cNvPr id="72" name="Rounded Rectangle 71"/>
@@ -5648,8 +5808,8 @@
             </p:nvSpPr>
             <p:spPr>
               <a:xfrm>
-                <a:off x="9475261" y="2604305"/>
-                <a:ext cx="2010109" cy="877171"/>
+                <a:off x="9516983" y="2604305"/>
+                <a:ext cx="2124802" cy="877171"/>
               </a:xfrm>
               <a:prstGeom prst="roundRect">
                 <a:avLst/>
@@ -5689,8 +5849,8 @@
             </p:nvSpPr>
             <p:spPr>
               <a:xfrm>
-                <a:off x="9475262" y="3659884"/>
-                <a:ext cx="2231464" cy="877171"/>
+                <a:off x="9516982" y="3659884"/>
+                <a:ext cx="2346158" cy="877171"/>
               </a:xfrm>
               <a:prstGeom prst="roundRect">
                 <a:avLst/>
@@ -5757,10 +5917,10 @@
                         <m:e>
                           <m:d>
                             <m:dPr>
-                              <m:begChr m:val="{"/>
-                              <m:endChr m:val="}"/>
+                              <m:begChr m:val="|"/>
+                              <m:endChr m:val="|"/>
                               <m:ctrlPr>
-                                <a:rPr lang="en-US" b="0" i="1" smtClean="0">
+                                <a:rPr lang="hr-HR" b="0" i="1" smtClean="0">
                                   <a:solidFill>
                                     <a:schemeClr val="tx1"/>
                                   </a:solidFill>
@@ -5769,15 +5929,31 @@
                               </m:ctrlPr>
                             </m:dPr>
                             <m:e>
-                              <m:r>
-                                <a:rPr lang="en-US" b="0" i="1" smtClean="0">
-                                  <a:solidFill>
-                                    <a:schemeClr val="tx1"/>
-                                  </a:solidFill>
-                                  <a:latin typeface="Cambria Math" charset="0"/>
-                                </a:rPr>
-                                <m:t>1,3</m:t>
-                              </m:r>
+                              <m:d>
+                                <m:dPr>
+                                  <m:begChr m:val="{"/>
+                                  <m:endChr m:val="}"/>
+                                  <m:ctrlPr>
+                                    <a:rPr lang="en-US" i="1">
+                                      <a:solidFill>
+                                        <a:schemeClr val="tx1"/>
+                                      </a:solidFill>
+                                      <a:latin typeface="Cambria Math" charset="0"/>
+                                    </a:rPr>
+                                  </m:ctrlPr>
+                                </m:dPr>
+                                <m:e>
+                                  <m:r>
+                                    <a:rPr lang="en-US" i="1">
+                                      <a:solidFill>
+                                        <a:schemeClr val="tx1"/>
+                                      </a:solidFill>
+                                      <a:latin typeface="Cambria Math" charset="0"/>
+                                    </a:rPr>
+                                    <m:t>1,3</m:t>
+                                  </m:r>
+                                </m:e>
+                              </m:d>
                             </m:e>
                           </m:d>
                           <m:r>
@@ -5930,8 +6106,8 @@
             </p:nvSpPr>
             <p:spPr>
               <a:xfrm>
-                <a:off x="9475262" y="3659884"/>
-                <a:ext cx="2231464" cy="877171"/>
+                <a:off x="9516982" y="3659884"/>
+                <a:ext cx="2346158" cy="877171"/>
               </a:xfrm>
               <a:prstGeom prst="roundRect">
                 <a:avLst/>
@@ -5971,8 +6147,8 @@
             </p:nvSpPr>
             <p:spPr>
               <a:xfrm>
-                <a:off x="9475262" y="4715463"/>
-                <a:ext cx="2255528" cy="877171"/>
+                <a:off x="9516982" y="4715463"/>
+                <a:ext cx="2370222" cy="877171"/>
               </a:xfrm>
               <a:prstGeom prst="roundRect">
                 <a:avLst/>
@@ -6039,10 +6215,10 @@
                         <m:e>
                           <m:d>
                             <m:dPr>
-                              <m:begChr m:val="{"/>
-                              <m:endChr m:val="}"/>
+                              <m:begChr m:val="|"/>
+                              <m:endChr m:val="|"/>
                               <m:ctrlPr>
-                                <a:rPr lang="en-US" b="0" i="1" smtClean="0">
+                                <a:rPr lang="hr-HR" b="0" i="1" smtClean="0">
                                   <a:solidFill>
                                     <a:schemeClr val="tx1"/>
                                   </a:solidFill>
@@ -6051,15 +6227,31 @@
                               </m:ctrlPr>
                             </m:dPr>
                             <m:e>
-                              <m:r>
-                                <a:rPr lang="en-US" b="0" i="1" smtClean="0">
-                                  <a:solidFill>
-                                    <a:schemeClr val="tx1"/>
-                                  </a:solidFill>
-                                  <a:latin typeface="Cambria Math" charset="0"/>
-                                </a:rPr>
-                                <m:t>1,3</m:t>
-                              </m:r>
+                              <m:d>
+                                <m:dPr>
+                                  <m:begChr m:val="{"/>
+                                  <m:endChr m:val="}"/>
+                                  <m:ctrlPr>
+                                    <a:rPr lang="en-US" i="1">
+                                      <a:solidFill>
+                                        <a:schemeClr val="tx1"/>
+                                      </a:solidFill>
+                                      <a:latin typeface="Cambria Math" charset="0"/>
+                                    </a:rPr>
+                                  </m:ctrlPr>
+                                </m:dPr>
+                                <m:e>
+                                  <m:r>
+                                    <a:rPr lang="en-US" i="1">
+                                      <a:solidFill>
+                                        <a:schemeClr val="tx1"/>
+                                      </a:solidFill>
+                                      <a:latin typeface="Cambria Math" charset="0"/>
+                                    </a:rPr>
+                                    <m:t>1,3</m:t>
+                                  </m:r>
+                                </m:e>
+                              </m:d>
                             </m:e>
                           </m:d>
                           <m:r>
@@ -6221,8 +6413,8 @@
             </p:nvSpPr>
             <p:spPr>
               <a:xfrm>
-                <a:off x="9475262" y="4715463"/>
-                <a:ext cx="2255528" cy="877171"/>
+                <a:off x="9516982" y="4715463"/>
+                <a:ext cx="2370222" cy="877171"/>
               </a:xfrm>
               <a:prstGeom prst="roundRect">
                 <a:avLst/>
@@ -6252,8 +6444,8 @@
           </p:sp>
         </mc:Fallback>
       </mc:AlternateContent>
-      <mc:AlternateContent xmlns:mc="http://schemas.openxmlformats.org/markup-compatibility/2006" xmlns:a14="http://schemas.microsoft.com/office/drawing/2010/main">
-        <mc:Choice Requires="a14">
+      <mc:AlternateContent xmlns:mc="http://schemas.openxmlformats.org/markup-compatibility/2006">
+        <mc:Choice xmlns:a14="http://schemas.microsoft.com/office/drawing/2010/main" Requires="a14">
           <p:sp>
             <p:nvSpPr>
               <p:cNvPr id="76" name="Rounded Rectangle 75"/>
@@ -6262,8 +6454,8 @@
             </p:nvSpPr>
             <p:spPr>
               <a:xfrm>
-                <a:off x="9475260" y="5771042"/>
-                <a:ext cx="2410711" cy="877171"/>
+                <a:off x="9516982" y="5771042"/>
+                <a:ext cx="2525403" cy="877171"/>
               </a:xfrm>
               <a:prstGeom prst="roundRect">
                 <a:avLst/>
@@ -6295,7 +6487,7 @@
               </a:fontRef>
             </p:style>
             <p:txBody>
-              <a:bodyPr lIns="288000" tIns="72000" rIns="288000" bIns="72000" rtlCol="0" anchor="ctr">
+              <a:bodyPr wrap="square" lIns="288000" tIns="72000" rIns="288000" bIns="72000" rtlCol="0" anchor="ctr">
                 <a:spAutoFit/>
               </a:bodyPr>
               <a:lstStyle/>
@@ -6330,10 +6522,10 @@
                         <m:e>
                           <m:d>
                             <m:dPr>
-                              <m:begChr m:val="{"/>
-                              <m:endChr m:val="}"/>
+                              <m:begChr m:val="|"/>
+                              <m:endChr m:val="|"/>
                               <m:ctrlPr>
-                                <a:rPr lang="en-US" b="0" i="1" smtClean="0">
+                                <a:rPr lang="hr-HR" b="0" i="1" smtClean="0">
                                   <a:solidFill>
                                     <a:schemeClr val="tx1"/>
                                   </a:solidFill>
@@ -6342,15 +6534,31 @@
                               </m:ctrlPr>
                             </m:dPr>
                             <m:e>
-                              <m:r>
-                                <a:rPr lang="en-US" b="0" i="1" smtClean="0">
-                                  <a:solidFill>
-                                    <a:schemeClr val="tx1"/>
-                                  </a:solidFill>
-                                  <a:latin typeface="Cambria Math" charset="0"/>
-                                </a:rPr>
-                                <m:t>1,2,3</m:t>
-                              </m:r>
+                              <m:d>
+                                <m:dPr>
+                                  <m:begChr m:val="{"/>
+                                  <m:endChr m:val="}"/>
+                                  <m:ctrlPr>
+                                    <a:rPr lang="en-US" i="1">
+                                      <a:solidFill>
+                                        <a:schemeClr val="tx1"/>
+                                      </a:solidFill>
+                                      <a:latin typeface="Cambria Math" charset="0"/>
+                                    </a:rPr>
+                                  </m:ctrlPr>
+                                </m:dPr>
+                                <m:e>
+                                  <m:r>
+                                    <a:rPr lang="en-US" i="1">
+                                      <a:solidFill>
+                                        <a:schemeClr val="tx1"/>
+                                      </a:solidFill>
+                                      <a:latin typeface="Cambria Math" charset="0"/>
+                                    </a:rPr>
+                                    <m:t>1,2,3</m:t>
+                                  </m:r>
+                                </m:e>
+                              </m:d>
                             </m:e>
                           </m:d>
                           <m:r>
@@ -6501,7 +6709,7 @@
             </p:txBody>
           </p:sp>
         </mc:Choice>
-        <mc:Fallback xmlns="">
+        <mc:Fallback>
           <p:sp>
             <p:nvSpPr>
               <p:cNvPr id="76" name="Rounded Rectangle 75"/>
@@ -6512,8 +6720,8 @@
             </p:nvSpPr>
             <p:spPr>
               <a:xfrm>
-                <a:off x="9475260" y="5771042"/>
-                <a:ext cx="2410711" cy="877171"/>
+                <a:off x="9516982" y="5771042"/>
+                <a:ext cx="2525403" cy="877171"/>
               </a:xfrm>
               <a:prstGeom prst="roundRect">
                 <a:avLst/>
@@ -6554,8 +6762,8 @@
         </p:nvCxnSpPr>
         <p:spPr>
           <a:xfrm flipV="1">
-            <a:off x="8709632" y="924878"/>
-            <a:ext cx="765628" cy="518984"/>
+            <a:off x="8902142" y="924878"/>
+            <a:ext cx="614840" cy="518984"/>
           </a:xfrm>
           <a:prstGeom prst="straightConnector1">
             <a:avLst/>
@@ -6595,8 +6803,8 @@
         </p:nvCxnSpPr>
         <p:spPr>
           <a:xfrm>
-            <a:off x="8709632" y="1443862"/>
-            <a:ext cx="765629" cy="540523"/>
+            <a:off x="8902142" y="1443862"/>
+            <a:ext cx="614840" cy="540523"/>
           </a:xfrm>
           <a:prstGeom prst="straightConnector1">
             <a:avLst/>
@@ -6636,8 +6844,8 @@
         </p:nvCxnSpPr>
         <p:spPr>
           <a:xfrm flipV="1">
-            <a:off x="8757758" y="3042891"/>
-            <a:ext cx="717503" cy="543320"/>
+            <a:off x="8950268" y="3042891"/>
+            <a:ext cx="566715" cy="519256"/>
           </a:xfrm>
           <a:prstGeom prst="straightConnector1">
             <a:avLst/>
@@ -6677,8 +6885,8 @@
         </p:nvCxnSpPr>
         <p:spPr>
           <a:xfrm>
-            <a:off x="8757758" y="3586211"/>
-            <a:ext cx="717504" cy="512259"/>
+            <a:off x="8950268" y="3562147"/>
+            <a:ext cx="566714" cy="536323"/>
           </a:xfrm>
           <a:prstGeom prst="straightConnector1">
             <a:avLst/>
@@ -6718,8 +6926,8 @@
         </p:nvCxnSpPr>
         <p:spPr>
           <a:xfrm flipV="1">
-            <a:off x="8996384" y="5154049"/>
-            <a:ext cx="478878" cy="565296"/>
+            <a:off x="9188894" y="5154049"/>
+            <a:ext cx="328088" cy="541232"/>
           </a:xfrm>
           <a:prstGeom prst="straightConnector1">
             <a:avLst/>
@@ -6759,8 +6967,8 @@
         </p:nvCxnSpPr>
         <p:spPr>
           <a:xfrm>
-            <a:off x="8996384" y="5719345"/>
-            <a:ext cx="478876" cy="490283"/>
+            <a:off x="9188894" y="5695281"/>
+            <a:ext cx="328088" cy="514347"/>
           </a:xfrm>
           <a:prstGeom prst="straightConnector1">
             <a:avLst/>
@@ -6797,7 +7005,7 @@
         </p:nvSpPr>
         <p:spPr>
           <a:xfrm>
-            <a:off x="2289842" y="2194372"/>
+            <a:off x="2362690" y="2480979"/>
             <a:ext cx="468000" cy="467343"/>
           </a:xfrm>
           <a:prstGeom prst="ellipse">
@@ -6855,7 +7063,7 @@
         </p:nvSpPr>
         <p:spPr>
           <a:xfrm>
-            <a:off x="5008438" y="693352"/>
+            <a:off x="5239044" y="700903"/>
             <a:ext cx="468000" cy="467343"/>
           </a:xfrm>
           <a:prstGeom prst="ellipse">
@@ -6913,7 +7121,7 @@
         </p:nvSpPr>
         <p:spPr>
           <a:xfrm>
-            <a:off x="5359358" y="4325301"/>
+            <a:off x="5455614" y="4373429"/>
             <a:ext cx="468000" cy="467343"/>
           </a:xfrm>
           <a:prstGeom prst="ellipse">
@@ -6978,7 +7186,7 @@
         </p:nvSpPr>
         <p:spPr>
           <a:xfrm>
-            <a:off x="8241632" y="1210190"/>
+            <a:off x="8434142" y="1210190"/>
             <a:ext cx="468000" cy="467343"/>
           </a:xfrm>
           <a:prstGeom prst="ellipse">
@@ -7043,7 +7251,7 @@
         </p:nvSpPr>
         <p:spPr>
           <a:xfrm>
-            <a:off x="8289758" y="3352539"/>
+            <a:off x="8482268" y="3328475"/>
             <a:ext cx="468000" cy="467343"/>
           </a:xfrm>
           <a:prstGeom prst="ellipse">
@@ -7108,7 +7316,7 @@
         </p:nvSpPr>
         <p:spPr>
           <a:xfrm>
-            <a:off x="8528384" y="5485673"/>
+            <a:off x="8720894" y="5461609"/>
             <a:ext cx="468000" cy="467343"/>
           </a:xfrm>
           <a:prstGeom prst="ellipse">

</xml_diff>